<commit_message>
week 2 slides and r code
</commit_message>
<xml_diff>
--- a/docs/lectures/welcome.pptx
+++ b/docs/lectures/welcome.pptx
@@ -6892,7 +6892,7 @@
           <a:p>
             <a:pPr lvl="2"/>
             <a:r>
-              <a:rPr lang="en-US" sz="1900" dirty="0"/>
+              <a:rPr lang="en-US" sz="1900" b="1" dirty="0"/>
               <a:t>Role of experimentation vs observation </a:t>
             </a:r>
           </a:p>
@@ -9349,21 +9349,21 @@
 </file>
 
 <file path=customXml/item1.xml><?xml version="1.0" encoding="utf-8"?>
+<p:properties xmlns:p="http://schemas.microsoft.com/office/2006/metadata/properties" xmlns:xsi="http://www.w3.org/2001/XMLSchema-instance" xmlns:pc="http://schemas.microsoft.com/office/infopath/2007/PartnerControls">
+  <documentManagement>
+    <Status xmlns="71af3243-3dd4-4a8d-8c0d-dd76da1f02a5">Not started</Status>
+    <MediaServiceKeyPoints xmlns="71af3243-3dd4-4a8d-8c0d-dd76da1f02a5" xsi:nil="true"/>
+  </documentManagement>
+</p:properties>
+</file>
+
+<file path=customXml/item2.xml><?xml version="1.0" encoding="utf-8"?>
 <?mso-contentType ?>
 <FormTemplates xmlns="http://schemas.microsoft.com/sharepoint/v3/contenttype/forms">
   <Display>DocumentLibraryForm</Display>
   <Edit>DocumentLibraryForm</Edit>
   <New>DocumentLibraryForm</New>
 </FormTemplates>
-</file>
-
-<file path=customXml/item2.xml><?xml version="1.0" encoding="utf-8"?>
-<p:properties xmlns:p="http://schemas.microsoft.com/office/2006/metadata/properties" xmlns:xsi="http://www.w3.org/2001/XMLSchema-instance" xmlns:pc="http://schemas.microsoft.com/office/infopath/2007/PartnerControls">
-  <documentManagement>
-    <Status xmlns="71af3243-3dd4-4a8d-8c0d-dd76da1f02a5">Not started</Status>
-    <MediaServiceKeyPoints xmlns="71af3243-3dd4-4a8d-8c0d-dd76da1f02a5" xsi:nil="true"/>
-  </documentManagement>
-</p:properties>
 </file>
 
 <file path=customXml/item3.xml><?xml version="1.0" encoding="utf-8"?>
@@ -9588,14 +9588,6 @@
 </file>
 
 <file path=customXml/itemProps1.xml><?xml version="1.0" encoding="utf-8"?>
-<ds:datastoreItem xmlns:ds="http://schemas.openxmlformats.org/officeDocument/2006/customXml" ds:itemID="{659927E4-E194-47BE-91C2-B87D50CF51DB}">
-  <ds:schemaRefs>
-    <ds:schemaRef ds:uri="http://schemas.microsoft.com/sharepoint/v3/contenttype/forms"/>
-  </ds:schemaRefs>
-</ds:datastoreItem>
-</file>
-
-<file path=customXml/itemProps2.xml><?xml version="1.0" encoding="utf-8"?>
 <ds:datastoreItem xmlns:ds="http://schemas.openxmlformats.org/officeDocument/2006/customXml" ds:itemID="{0E92E9E5-79AF-4029-8FCA-9C327D54FD8F}">
   <ds:schemaRefs>
     <ds:schemaRef ds:uri="71af3243-3dd4-4a8d-8c0d-dd76da1f02a5"/>
@@ -9608,6 +9600,14 @@
     <ds:schemaRef ds:uri="http://www.w3.org/XML/1998/namespace"/>
     <ds:schemaRef ds:uri="http://schemas.microsoft.com/office/infopath/2007/PartnerControls"/>
     <ds:schemaRef ds:uri="http://schemas.openxmlformats.org/package/2006/metadata/core-properties"/>
+  </ds:schemaRefs>
+</ds:datastoreItem>
+</file>
+
+<file path=customXml/itemProps2.xml><?xml version="1.0" encoding="utf-8"?>
+<ds:datastoreItem xmlns:ds="http://schemas.openxmlformats.org/officeDocument/2006/customXml" ds:itemID="{659927E4-E194-47BE-91C2-B87D50CF51DB}">
+  <ds:schemaRefs>
+    <ds:schemaRef ds:uri="http://schemas.microsoft.com/sharepoint/v3/contenttype/forms"/>
   </ds:schemaRefs>
 </ds:datastoreItem>
 </file>

</xml_diff>